<commit_message>
made some changes to ppt
</commit_message>
<xml_diff>
--- a/Attendance_System.pptx
+++ b/Attendance_System.pptx
@@ -5,14 +5,13 @@
     <p:sldMasterId id="2147483648" r:id="rId1"/>
   </p:sldMasterIdLst>
   <p:sldIdLst>
-    <p:sldId id="256" r:id="rId2"/>
-    <p:sldId id="257" r:id="rId3"/>
-    <p:sldId id="258" r:id="rId4"/>
-    <p:sldId id="259" r:id="rId5"/>
-    <p:sldId id="260" r:id="rId6"/>
-    <p:sldId id="263" r:id="rId7"/>
-    <p:sldId id="261" r:id="rId8"/>
-    <p:sldId id="262" r:id="rId9"/>
+    <p:sldId id="257" r:id="rId2"/>
+    <p:sldId id="258" r:id="rId3"/>
+    <p:sldId id="259" r:id="rId4"/>
+    <p:sldId id="260" r:id="rId5"/>
+    <p:sldId id="263" r:id="rId6"/>
+    <p:sldId id="261" r:id="rId7"/>
+    <p:sldId id="262" r:id="rId8"/>
   </p:sldIdLst>
   <p:sldSz cx="12192000" cy="6858000"/>
   <p:notesSz cx="6858000" cy="9144000"/>
@@ -1529,7 +1528,7 @@
             <a:fld id="{48A87A34-81AB-432B-8DAE-1953F412C126}" type="datetimeFigureOut">
               <a:rPr lang="en-US" dirty="0"/>
               <a:pPr/>
-              <a:t>11/25/21</a:t>
+              <a:t>7/23/22</a:t>
             </a:fld>
             <a:endParaRPr lang="en-US" dirty="0"/>
           </a:p>
@@ -2983,7 +2982,7 @@
           <a:p>
             <a:fld id="{48A87A34-81AB-432B-8DAE-1953F412C126}" type="datetimeFigureOut">
               <a:rPr lang="en-US" dirty="0"/>
-              <a:t>11/25/21</a:t>
+              <a:t>7/23/22</a:t>
             </a:fld>
             <a:endParaRPr lang="en-US" dirty="0"/>
           </a:p>
@@ -4431,7 +4430,7 @@
           <a:p>
             <a:fld id="{48A87A34-81AB-432B-8DAE-1953F412C126}" type="datetimeFigureOut">
               <a:rPr lang="en-US" dirty="0"/>
-              <a:t>11/25/21</a:t>
+              <a:t>7/23/22</a:t>
             </a:fld>
             <a:endParaRPr lang="en-US" dirty="0"/>
           </a:p>
@@ -5881,7 +5880,7 @@
           <a:p>
             <a:fld id="{48A87A34-81AB-432B-8DAE-1953F412C126}" type="datetimeFigureOut">
               <a:rPr lang="en-US" dirty="0"/>
-              <a:t>11/25/21</a:t>
+              <a:t>7/23/22</a:t>
             </a:fld>
             <a:endParaRPr lang="en-US" dirty="0"/>
           </a:p>
@@ -7384,7 +7383,7 @@
           <a:p>
             <a:fld id="{48A87A34-81AB-432B-8DAE-1953F412C126}" type="datetimeFigureOut">
               <a:rPr lang="en-US" dirty="0"/>
-              <a:t>11/25/21</a:t>
+              <a:t>7/23/22</a:t>
             </a:fld>
             <a:endParaRPr lang="en-US" dirty="0"/>
           </a:p>
@@ -8900,7 +8899,7 @@
           <a:p>
             <a:fld id="{48A87A34-81AB-432B-8DAE-1953F412C126}" type="datetimeFigureOut">
               <a:rPr lang="en-US" dirty="0"/>
-              <a:t>11/25/21</a:t>
+              <a:t>7/23/22</a:t>
             </a:fld>
             <a:endParaRPr lang="en-US" dirty="0"/>
           </a:p>
@@ -10560,7 +10559,7 @@
           <a:p>
             <a:fld id="{48A87A34-81AB-432B-8DAE-1953F412C126}" type="datetimeFigureOut">
               <a:rPr lang="en-US" dirty="0"/>
-              <a:t>11/25/21</a:t>
+              <a:t>7/23/22</a:t>
             </a:fld>
             <a:endParaRPr lang="en-US" dirty="0"/>
           </a:p>
@@ -11953,7 +11952,7 @@
           <a:p>
             <a:fld id="{48A87A34-81AB-432B-8DAE-1953F412C126}" type="datetimeFigureOut">
               <a:rPr lang="en-US" dirty="0"/>
-              <a:t>11/25/21</a:t>
+              <a:t>7/23/22</a:t>
             </a:fld>
             <a:endParaRPr lang="en-US" dirty="0"/>
           </a:p>
@@ -12048,7 +12047,7 @@
           <a:p>
             <a:fld id="{48A87A34-81AB-432B-8DAE-1953F412C126}" type="datetimeFigureOut">
               <a:rPr lang="en-US" dirty="0"/>
-              <a:t>11/25/21</a:t>
+              <a:t>7/23/22</a:t>
             </a:fld>
             <a:endParaRPr lang="en-US" dirty="0"/>
           </a:p>
@@ -13569,7 +13568,7 @@
           <a:p>
             <a:fld id="{48A87A34-81AB-432B-8DAE-1953F412C126}" type="datetimeFigureOut">
               <a:rPr lang="en-US" dirty="0"/>
-              <a:t>11/25/21</a:t>
+              <a:t>7/23/22</a:t>
             </a:fld>
             <a:endParaRPr lang="en-US" dirty="0"/>
           </a:p>
@@ -15100,7 +15099,7 @@
           <a:p>
             <a:fld id="{48A87A34-81AB-432B-8DAE-1953F412C126}" type="datetimeFigureOut">
               <a:rPr lang="en-US" dirty="0"/>
-              <a:t>11/25/21</a:t>
+              <a:t>7/23/22</a:t>
             </a:fld>
             <a:endParaRPr lang="en-US" dirty="0"/>
           </a:p>
@@ -15319,7 +15318,7 @@
             <a:fld id="{48A87A34-81AB-432B-8DAE-1953F412C126}" type="datetimeFigureOut">
               <a:rPr lang="en-US" dirty="0"/>
               <a:pPr/>
-              <a:t>11/25/21</a:t>
+              <a:t>7/23/22</a:t>
             </a:fld>
             <a:endParaRPr lang="en-US" dirty="0"/>
           </a:p>
@@ -15771,114 +15770,6 @@
           <p:cNvPr id="2" name="Title 1">
             <a:extLst>
               <a:ext uri="{FF2B5EF4-FFF2-40B4-BE49-F238E27FC236}">
-                <a16:creationId xmlns:a16="http://schemas.microsoft.com/office/drawing/2014/main" id="{57F3CFAB-FD6C-FA44-813D-0AA4A75EE8F4}"/>
-              </a:ext>
-            </a:extLst>
-          </p:cNvPr>
-          <p:cNvSpPr>
-            <a:spLocks noGrp="1"/>
-          </p:cNvSpPr>
-          <p:nvPr>
-            <p:ph type="ctrTitle"/>
-          </p:nvPr>
-        </p:nvSpPr>
-        <p:spPr>
-          <a:xfrm>
-            <a:off x="1759236" y="1828800"/>
-            <a:ext cx="8679915" cy="2541319"/>
-          </a:xfrm>
-        </p:spPr>
-        <p:txBody>
-          <a:bodyPr>
-            <a:normAutofit/>
-          </a:bodyPr>
-          <a:lstStyle/>
-          <a:p>
-            <a:r>
-              <a:rPr lang="en-US" dirty="0"/>
-              <a:t>ATTENDANCE SYSTEM USING RASPBERRY PI AND FACE IDENTIFICATION</a:t>
-            </a:r>
-          </a:p>
-        </p:txBody>
-      </p:sp>
-      <p:sp>
-        <p:nvSpPr>
-          <p:cNvPr id="3" name="Subtitle 2">
-            <a:extLst>
-              <a:ext uri="{FF2B5EF4-FFF2-40B4-BE49-F238E27FC236}">
-                <a16:creationId xmlns:a16="http://schemas.microsoft.com/office/drawing/2014/main" id="{5B04C9CF-3A79-B74F-B3CB-A6538EA5B6D7}"/>
-              </a:ext>
-            </a:extLst>
-          </p:cNvPr>
-          <p:cNvSpPr>
-            <a:spLocks noGrp="1"/>
-          </p:cNvSpPr>
-          <p:nvPr>
-            <p:ph type="subTitle" idx="1"/>
-          </p:nvPr>
-        </p:nvSpPr>
-        <p:spPr>
-          <a:xfrm>
-            <a:off x="1759236" y="3918141"/>
-            <a:ext cx="8673427" cy="1322587"/>
-          </a:xfrm>
-        </p:spPr>
-        <p:txBody>
-          <a:bodyPr/>
-          <a:lstStyle/>
-          <a:p>
-            <a:endParaRPr lang="en-US" dirty="0"/>
-          </a:p>
-          <a:p>
-            <a:endParaRPr lang="en-US" dirty="0"/>
-          </a:p>
-          <a:p>
-            <a:r>
-              <a:rPr lang="en-US" dirty="0" err="1"/>
-              <a:t>Ch.Rahul</a:t>
-            </a:r>
-            <a:r>
-              <a:rPr lang="en-US" dirty="0"/>
-              <a:t> Reddy  2018BEC05 ( ECE ) SCHOOL OF ENGINEERING</a:t>
-            </a:r>
-          </a:p>
-        </p:txBody>
-      </p:sp>
-    </p:spTree>
-    <p:extLst>
-      <p:ext uri="{BB962C8B-B14F-4D97-AF65-F5344CB8AC3E}">
-        <p14:creationId xmlns:p14="http://schemas.microsoft.com/office/powerpoint/2010/main" val="3684471163"/>
-      </p:ext>
-    </p:extLst>
-  </p:cSld>
-  <p:clrMapOvr>
-    <a:masterClrMapping/>
-  </p:clrMapOvr>
-</p:sld>
-</file>
-
-<file path=ppt/slides/slide2.xml><?xml version="1.0" encoding="utf-8"?>
-<p:sld xmlns:a="http://schemas.openxmlformats.org/drawingml/2006/main" xmlns:r="http://schemas.openxmlformats.org/officeDocument/2006/relationships" xmlns:p="http://schemas.openxmlformats.org/presentationml/2006/main">
-  <p:cSld>
-    <p:spTree>
-      <p:nvGrpSpPr>
-        <p:cNvPr id="1" name=""/>
-        <p:cNvGrpSpPr/>
-        <p:nvPr/>
-      </p:nvGrpSpPr>
-      <p:grpSpPr>
-        <a:xfrm>
-          <a:off x="0" y="0"/>
-          <a:ext cx="0" cy="0"/>
-          <a:chOff x="0" y="0"/>
-          <a:chExt cx="0" cy="0"/>
-        </a:xfrm>
-      </p:grpSpPr>
-      <p:sp>
-        <p:nvSpPr>
-          <p:cNvPr id="2" name="Title 1">
-            <a:extLst>
-              <a:ext uri="{FF2B5EF4-FFF2-40B4-BE49-F238E27FC236}">
                 <a16:creationId xmlns:a16="http://schemas.microsoft.com/office/drawing/2014/main" id="{54C41B53-FD8B-B549-9C3C-471070F4ABE5}"/>
               </a:ext>
             </a:extLst>
@@ -15955,7 +15846,7 @@
 </p:sld>
 </file>
 
-<file path=ppt/slides/slide3.xml><?xml version="1.0" encoding="utf-8"?>
+<file path=ppt/slides/slide2.xml><?xml version="1.0" encoding="utf-8"?>
 <p:sld xmlns:a="http://schemas.openxmlformats.org/drawingml/2006/main" xmlns:r="http://schemas.openxmlformats.org/officeDocument/2006/relationships" xmlns:p="http://schemas.openxmlformats.org/presentationml/2006/main">
   <p:cSld>
     <p:spTree>
@@ -16091,7 +15982,7 @@
 </p:sld>
 </file>
 
-<file path=ppt/slides/slide4.xml><?xml version="1.0" encoding="utf-8"?>
+<file path=ppt/slides/slide3.xml><?xml version="1.0" encoding="utf-8"?>
 <p:sld xmlns:a="http://schemas.openxmlformats.org/drawingml/2006/main" xmlns:r="http://schemas.openxmlformats.org/officeDocument/2006/relationships" xmlns:p="http://schemas.openxmlformats.org/presentationml/2006/main">
   <p:cSld>
     <p:spTree>
@@ -16198,7 +16089,7 @@
 </p:sld>
 </file>
 
-<file path=ppt/slides/slide5.xml><?xml version="1.0" encoding="utf-8"?>
+<file path=ppt/slides/slide4.xml><?xml version="1.0" encoding="utf-8"?>
 <p:sld xmlns:a="http://schemas.openxmlformats.org/drawingml/2006/main" xmlns:r="http://schemas.openxmlformats.org/officeDocument/2006/relationships" xmlns:p="http://schemas.openxmlformats.org/presentationml/2006/main">
   <p:cSld>
     <p:spTree>
@@ -16304,7 +16195,7 @@
 </p:sld>
 </file>
 
-<file path=ppt/slides/slide6.xml><?xml version="1.0" encoding="utf-8"?>
+<file path=ppt/slides/slide5.xml><?xml version="1.0" encoding="utf-8"?>
 <p:sld xmlns:a="http://schemas.openxmlformats.org/drawingml/2006/main" xmlns:r="http://schemas.openxmlformats.org/officeDocument/2006/relationships" xmlns:p="http://schemas.openxmlformats.org/presentationml/2006/main">
   <p:cSld>
     <p:spTree>
@@ -16420,7 +16311,7 @@
 </p:sld>
 </file>
 
-<file path=ppt/slides/slide7.xml><?xml version="1.0" encoding="utf-8"?>
+<file path=ppt/slides/slide6.xml><?xml version="1.0" encoding="utf-8"?>
 <p:sld xmlns:a="http://schemas.openxmlformats.org/drawingml/2006/main" xmlns:r="http://schemas.openxmlformats.org/officeDocument/2006/relationships" xmlns:p="http://schemas.openxmlformats.org/presentationml/2006/main">
   <p:cSld>
     <p:spTree>
@@ -16555,7 +16446,7 @@
 </p:sld>
 </file>
 
-<file path=ppt/slides/slide8.xml><?xml version="1.0" encoding="utf-8"?>
+<file path=ppt/slides/slide7.xml><?xml version="1.0" encoding="utf-8"?>
 <p:sld xmlns:a="http://schemas.openxmlformats.org/drawingml/2006/main" xmlns:r="http://schemas.openxmlformats.org/officeDocument/2006/relationships" xmlns:p="http://schemas.openxmlformats.org/presentationml/2006/main">
   <p:cSld>
     <p:spTree>

</xml_diff>